<commit_message>
Completed Hierarchy and Tag List for entire Physics Research
Topics Completed: Fundamentals, Classical Mechanics, Statistical
Mechanics, Electricity & Magnetism, Optics, Quantum Mechanics.

Also, transformed the Visio diagram into an SVG file for easy viewing.
</commit_message>
<xml_diff>
--- a/Physics-Content/Hierarchy and Tag List/Physics - Hierarchy and Tag List (Powerpoint format).pptx
+++ b/Physics-Content/Hierarchy and Tag List/Physics - Hierarchy and Tag List (Powerpoint format).pptx
@@ -111,6 +111,11 @@
       </a:defRPr>
     </a:lvl9pPr>
   </p:defaultTextStyle>
+  <p:extLst>
+    <p:ext uri="{EFAFB233-063F-42B5-8137-9DF3F51BA10A}">
+      <p15:sldGuideLst xmlns:p15="http://schemas.microsoft.com/office/powerpoint/2012/main"/>
+    </p:ext>
+  </p:extLst>
 </p:presentation>
 </file>
 
@@ -344,7 +349,7 @@
             <a:fld id="{B61BEF0D-F0BB-DE4B-95CE-6DB70DBA9567}" type="datetimeFigureOut">
               <a:rPr lang="en-US" dirty="0"/>
               <a:pPr/>
-              <a:t>6/27/2016</a:t>
+              <a:t>7/5/2016</a:t>
             </a:fld>
             <a:endParaRPr lang="en-US" dirty="0"/>
           </a:p>
@@ -675,7 +680,7 @@
             <a:fld id="{B61BEF0D-F0BB-DE4B-95CE-6DB70DBA9567}" type="datetimeFigureOut">
               <a:rPr lang="en-US" dirty="0"/>
               <a:pPr/>
-              <a:t>6/27/2016</a:t>
+              <a:t>7/5/2016</a:t>
             </a:fld>
             <a:endParaRPr lang="en-US" dirty="0"/>
           </a:p>
@@ -950,7 +955,7 @@
             <a:fld id="{B61BEF0D-F0BB-DE4B-95CE-6DB70DBA9567}" type="datetimeFigureOut">
               <a:rPr lang="en-US" dirty="0"/>
               <a:pPr/>
-              <a:t>6/27/2016</a:t>
+              <a:t>7/5/2016</a:t>
             </a:fld>
             <a:endParaRPr lang="en-US" dirty="0"/>
           </a:p>
@@ -1515,7 +1520,7 @@
             <a:fld id="{B61BEF0D-F0BB-DE4B-95CE-6DB70DBA9567}" type="datetimeFigureOut">
               <a:rPr lang="en-US" dirty="0"/>
               <a:pPr/>
-              <a:t>6/27/2016</a:t>
+              <a:t>7/5/2016</a:t>
             </a:fld>
             <a:endParaRPr lang="en-US" dirty="0"/>
           </a:p>
@@ -1790,7 +1795,7 @@
             <a:fld id="{B61BEF0D-F0BB-DE4B-95CE-6DB70DBA9567}" type="datetimeFigureOut">
               <a:rPr lang="en-US" dirty="0"/>
               <a:pPr/>
-              <a:t>6/27/2016</a:t>
+              <a:t>7/5/2016</a:t>
             </a:fld>
             <a:endParaRPr lang="en-US" dirty="0"/>
           </a:p>
@@ -2349,7 +2354,7 @@
             <a:fld id="{B61BEF0D-F0BB-DE4B-95CE-6DB70DBA9567}" type="datetimeFigureOut">
               <a:rPr lang="en-US" dirty="0"/>
               <a:pPr/>
-              <a:t>6/27/2016</a:t>
+              <a:t>7/5/2016</a:t>
             </a:fld>
             <a:endParaRPr lang="en-US" dirty="0"/>
           </a:p>
@@ -2673,7 +2678,7 @@
             <a:fld id="{B61BEF0D-F0BB-DE4B-95CE-6DB70DBA9567}" type="datetimeFigureOut">
               <a:rPr lang="en-US" dirty="0"/>
               <a:pPr/>
-              <a:t>6/27/2016</a:t>
+              <a:t>7/5/2016</a:t>
             </a:fld>
             <a:endParaRPr lang="en-US" dirty="0"/>
           </a:p>
@@ -2847,7 +2852,7 @@
             <a:fld id="{B61BEF0D-F0BB-DE4B-95CE-6DB70DBA9567}" type="datetimeFigureOut">
               <a:rPr lang="en-US" dirty="0"/>
               <a:pPr/>
-              <a:t>6/27/2016</a:t>
+              <a:t>7/5/2016</a:t>
             </a:fld>
             <a:endParaRPr lang="en-US" dirty="0"/>
           </a:p>
@@ -3082,7 +3087,7 @@
             <a:fld id="{B61BEF0D-F0BB-DE4B-95CE-6DB70DBA9567}" type="datetimeFigureOut">
               <a:rPr lang="en-US" dirty="0"/>
               <a:pPr/>
-              <a:t>6/27/2016</a:t>
+              <a:t>7/5/2016</a:t>
             </a:fld>
             <a:endParaRPr lang="en-US" dirty="0"/>
           </a:p>
@@ -3279,7 +3284,7 @@
             <a:fld id="{B61BEF0D-F0BB-DE4B-95CE-6DB70DBA9567}" type="datetimeFigureOut">
               <a:rPr lang="en-US" dirty="0"/>
               <a:pPr/>
-              <a:t>6/27/2016</a:t>
+              <a:t>7/5/2016</a:t>
             </a:fld>
             <a:endParaRPr lang="en-US" dirty="0"/>
           </a:p>
@@ -3552,7 +3557,7 @@
             <a:fld id="{B61BEF0D-F0BB-DE4B-95CE-6DB70DBA9567}" type="datetimeFigureOut">
               <a:rPr lang="en-US" dirty="0"/>
               <a:pPr/>
-              <a:t>6/27/2016</a:t>
+              <a:t>7/5/2016</a:t>
             </a:fld>
             <a:endParaRPr lang="en-US" dirty="0"/>
           </a:p>
@@ -3815,7 +3820,7 @@
             <a:fld id="{B61BEF0D-F0BB-DE4B-95CE-6DB70DBA9567}" type="datetimeFigureOut">
               <a:rPr lang="en-US" dirty="0"/>
               <a:pPr/>
-              <a:t>6/27/2016</a:t>
+              <a:t>7/5/2016</a:t>
             </a:fld>
             <a:endParaRPr lang="en-US" dirty="0"/>
           </a:p>
@@ -4186,7 +4191,7 @@
             <a:fld id="{B61BEF0D-F0BB-DE4B-95CE-6DB70DBA9567}" type="datetimeFigureOut">
               <a:rPr lang="en-US" dirty="0"/>
               <a:pPr/>
-              <a:t>6/27/2016</a:t>
+              <a:t>7/5/2016</a:t>
             </a:fld>
             <a:endParaRPr lang="en-US" dirty="0"/>
           </a:p>
@@ -4331,7 +4336,7 @@
             <a:fld id="{B61BEF0D-F0BB-DE4B-95CE-6DB70DBA9567}" type="datetimeFigureOut">
               <a:rPr lang="en-US" dirty="0"/>
               <a:pPr/>
-              <a:t>6/27/2016</a:t>
+              <a:t>7/5/2016</a:t>
             </a:fld>
             <a:endParaRPr lang="en-US" dirty="0"/>
           </a:p>
@@ -4453,7 +4458,7 @@
             <a:fld id="{B61BEF0D-F0BB-DE4B-95CE-6DB70DBA9567}" type="datetimeFigureOut">
               <a:rPr lang="en-US" dirty="0"/>
               <a:pPr/>
-              <a:t>6/27/2016</a:t>
+              <a:t>7/5/2016</a:t>
             </a:fld>
             <a:endParaRPr lang="en-US" dirty="0"/>
           </a:p>
@@ -4735,7 +4740,7 @@
             <a:fld id="{B61BEF0D-F0BB-DE4B-95CE-6DB70DBA9567}" type="datetimeFigureOut">
               <a:rPr lang="en-US" dirty="0"/>
               <a:pPr/>
-              <a:t>6/27/2016</a:t>
+              <a:t>7/5/2016</a:t>
             </a:fld>
             <a:endParaRPr lang="en-US" dirty="0"/>
           </a:p>
@@ -5056,7 +5061,7 @@
             <a:fld id="{B61BEF0D-F0BB-DE4B-95CE-6DB70DBA9567}" type="datetimeFigureOut">
               <a:rPr lang="en-US" dirty="0"/>
               <a:pPr/>
-              <a:t>6/27/2016</a:t>
+              <a:t>7/5/2016</a:t>
             </a:fld>
             <a:endParaRPr lang="en-US" dirty="0"/>
           </a:p>
@@ -5267,7 +5272,7 @@
             <a:fld id="{B61BEF0D-F0BB-DE4B-95CE-6DB70DBA9567}" type="datetimeFigureOut">
               <a:rPr lang="en-US" dirty="0"/>
               <a:pPr/>
-              <a:t>6/27/2016</a:t>
+              <a:t>7/5/2016</a:t>
             </a:fld>
             <a:endParaRPr lang="en-US" dirty="0"/>
           </a:p>
@@ -5788,13 +5793,22 @@
         </p:nvSpPr>
         <p:spPr/>
         <p:txBody>
-          <a:bodyPr/>
+          <a:bodyPr>
+            <a:normAutofit fontScale="90000"/>
+          </a:bodyPr>
           <a:lstStyle/>
           <a:p>
             <a:pPr algn="ctr"/>
             <a:r>
               <a:rPr lang="en-CA" b="1" dirty="0"/>
               <a:t>Physics Hierarchy and Tag List</a:t>
+            </a:r>
+            <a:br>
+              <a:rPr lang="en-CA" b="1" dirty="0"/>
+            </a:br>
+            <a:r>
+              <a:rPr lang="en-CA" b="1" dirty="0"/>
+              <a:t>(Prepared by: Aman Kumar)</a:t>
             </a:r>
             <a:endParaRPr lang="en-US" b="1" dirty="0"/>
           </a:p>
@@ -5966,7 +5980,7 @@
       </p:grpSpPr>
       <p:pic>
         <p:nvPicPr>
-          <p:cNvPr id="2" name="Picture 1"/>
+          <p:cNvPr id="3" name="Picture 2"/>
           <p:cNvPicPr>
             <a:picLocks noChangeAspect="1"/>
           </p:cNvPicPr>
@@ -5980,8 +5994,8 @@
         </p:blipFill>
         <p:spPr>
           <a:xfrm>
-            <a:off x="57562" y="771333"/>
-            <a:ext cx="12076876" cy="5315334"/>
+            <a:off x="249288" y="587830"/>
+            <a:ext cx="11793034" cy="5747656"/>
           </a:xfrm>
           <a:prstGeom prst="rect">
             <a:avLst/>
@@ -6128,7 +6142,7 @@
       </p:grpSpPr>
       <p:pic>
         <p:nvPicPr>
-          <p:cNvPr id="2" name="Picture 1"/>
+          <p:cNvPr id="3" name="Picture 2"/>
           <p:cNvPicPr>
             <a:picLocks noChangeAspect="1"/>
           </p:cNvPicPr>
@@ -6142,8 +6156,8 @@
         </p:blipFill>
         <p:spPr>
           <a:xfrm>
-            <a:off x="1134749" y="771333"/>
-            <a:ext cx="9922501" cy="5315334"/>
+            <a:off x="3629025" y="195262"/>
+            <a:ext cx="4933950" cy="6467475"/>
           </a:xfrm>
           <a:prstGeom prst="rect">
             <a:avLst/>
@@ -6182,7 +6196,7 @@
       </p:grpSpPr>
       <p:pic>
         <p:nvPicPr>
-          <p:cNvPr id="3" name="Picture 2"/>
+          <p:cNvPr id="4" name="Picture 3"/>
           <p:cNvPicPr>
             <a:picLocks noChangeAspect="1"/>
           </p:cNvPicPr>
@@ -6196,8 +6210,8 @@
         </p:blipFill>
         <p:spPr>
           <a:xfrm>
-            <a:off x="1134749" y="771333"/>
-            <a:ext cx="9922501" cy="5315334"/>
+            <a:off x="345797" y="478971"/>
+            <a:ext cx="11535959" cy="5877605"/>
           </a:xfrm>
           <a:prstGeom prst="rect">
             <a:avLst/>

</xml_diff>